<commit_message>
Updated to newest gui screentshots.
Updated the documents and poster with the newest screen shot from the
GUI.
</commit_message>
<xml_diff>
--- a/Spring17/Poster/ExpoPoster.pptx
+++ b/Spring17/Poster/ExpoPoster.pptx
@@ -238,7 +238,7 @@
           <a:p>
             <a:fld id="{7395F848-6DDA-9042-95D4-0071278BB24B}" type="datetimeFigureOut">
               <a:rPr lang="en-US" smtClean="0"/>
-              <a:t>4/17/2017</a:t>
+              <a:t>4/24/2017</a:t>
             </a:fld>
             <a:endParaRPr lang="en-US"/>
           </a:p>
@@ -1386,7 +1386,7 @@
           <a:p>
             <a:fld id="{56B6BD69-149A-CD41-9E7C-E241C9398BA0}" type="datetimeFigureOut">
               <a:rPr lang="en-US" smtClean="0"/>
-              <a:t>4/17/2017</a:t>
+              <a:t>4/24/2017</a:t>
             </a:fld>
             <a:endParaRPr lang="en-US"/>
           </a:p>
@@ -1564,7 +1564,7 @@
           <a:p>
             <a:fld id="{56B6BD69-149A-CD41-9E7C-E241C9398BA0}" type="datetimeFigureOut">
               <a:rPr lang="en-US" smtClean="0"/>
-              <a:t>4/17/2017</a:t>
+              <a:t>4/24/2017</a:t>
             </a:fld>
             <a:endParaRPr lang="en-US"/>
           </a:p>
@@ -1732,7 +1732,7 @@
           <a:p>
             <a:fld id="{56B6BD69-149A-CD41-9E7C-E241C9398BA0}" type="datetimeFigureOut">
               <a:rPr lang="en-US" smtClean="0"/>
-              <a:t>4/17/2017</a:t>
+              <a:t>4/24/2017</a:t>
             </a:fld>
             <a:endParaRPr lang="en-US"/>
           </a:p>
@@ -1977,7 +1977,7 @@
           <a:p>
             <a:fld id="{56B6BD69-149A-CD41-9E7C-E241C9398BA0}" type="datetimeFigureOut">
               <a:rPr lang="en-US" smtClean="0"/>
-              <a:t>4/17/2017</a:t>
+              <a:t>4/24/2017</a:t>
             </a:fld>
             <a:endParaRPr lang="en-US"/>
           </a:p>
@@ -2262,7 +2262,7 @@
           <a:p>
             <a:fld id="{56B6BD69-149A-CD41-9E7C-E241C9398BA0}" type="datetimeFigureOut">
               <a:rPr lang="en-US" smtClean="0"/>
-              <a:t>4/17/2017</a:t>
+              <a:t>4/24/2017</a:t>
             </a:fld>
             <a:endParaRPr lang="en-US"/>
           </a:p>
@@ -2686,7 +2686,7 @@
           <a:p>
             <a:fld id="{56B6BD69-149A-CD41-9E7C-E241C9398BA0}" type="datetimeFigureOut">
               <a:rPr lang="en-US" smtClean="0"/>
-              <a:t>4/17/2017</a:t>
+              <a:t>4/24/2017</a:t>
             </a:fld>
             <a:endParaRPr lang="en-US"/>
           </a:p>
@@ -2803,7 +2803,7 @@
           <a:p>
             <a:fld id="{56B6BD69-149A-CD41-9E7C-E241C9398BA0}" type="datetimeFigureOut">
               <a:rPr lang="en-US" smtClean="0"/>
-              <a:t>4/17/2017</a:t>
+              <a:t>4/24/2017</a:t>
             </a:fld>
             <a:endParaRPr lang="en-US"/>
           </a:p>
@@ -2898,7 +2898,7 @@
           <a:p>
             <a:fld id="{56B6BD69-149A-CD41-9E7C-E241C9398BA0}" type="datetimeFigureOut">
               <a:rPr lang="en-US" smtClean="0"/>
-              <a:t>4/17/2017</a:t>
+              <a:t>4/24/2017</a:t>
             </a:fld>
             <a:endParaRPr lang="en-US"/>
           </a:p>
@@ -3173,7 +3173,7 @@
           <a:p>
             <a:fld id="{56B6BD69-149A-CD41-9E7C-E241C9398BA0}" type="datetimeFigureOut">
               <a:rPr lang="en-US" smtClean="0"/>
-              <a:t>4/17/2017</a:t>
+              <a:t>4/24/2017</a:t>
             </a:fld>
             <a:endParaRPr lang="en-US"/>
           </a:p>
@@ -3428,7 +3428,7 @@
           <a:p>
             <a:fld id="{56B6BD69-149A-CD41-9E7C-E241C9398BA0}" type="datetimeFigureOut">
               <a:rPr lang="en-US" smtClean="0"/>
-              <a:t>4/17/2017</a:t>
+              <a:t>4/24/2017</a:t>
             </a:fld>
             <a:endParaRPr lang="en-US"/>
           </a:p>
@@ -3640,7 +3640,7 @@
           <a:p>
             <a:fld id="{56B6BD69-149A-CD41-9E7C-E241C9398BA0}" type="datetimeFigureOut">
               <a:rPr lang="en-US" smtClean="0"/>
-              <a:t>4/17/2017</a:t>
+              <a:t>4/24/2017</a:t>
             </a:fld>
             <a:endParaRPr lang="en-US"/>
           </a:p>
@@ -4040,7 +4040,7 @@
             <a:pPr algn="l"/>
             <a:r>
               <a:rPr lang="en-US" sz="8000" b="1" cap="all" dirty="0"/>
-              <a:t>HYRO. DATA VISUALIZATION ON A HYBRID ROCKET </a:t>
+              <a:t>DATA VISUALIZATION ON a ROCKET </a:t>
             </a:r>
           </a:p>
         </p:txBody>
@@ -4057,7 +4057,7 @@
         </p:nvSpPr>
         <p:spPr>
           <a:xfrm>
-            <a:off x="12469124" y="4298241"/>
+            <a:off x="12407125" y="3963717"/>
             <a:ext cx="18951755" cy="1253636"/>
           </a:xfrm>
         </p:spPr>
@@ -4076,7 +4076,7 @@
                   <a:srgbClr val="F37321"/>
                 </a:solidFill>
               </a:rPr>
-              <a:t>How to visualize data from a rocket.</a:t>
+              <a:t>How do we watch data from a rocket live?</a:t>
             </a:r>
           </a:p>
         </p:txBody>
@@ -4357,7 +4357,7 @@
         </p:nvSpPr>
         <p:spPr>
           <a:xfrm>
-            <a:off x="1406151" y="5331461"/>
+            <a:off x="1406151" y="4773433"/>
             <a:ext cx="8550648" cy="15394939"/>
           </a:xfrm>
           <a:prstGeom prst="rect">
@@ -4409,7 +4409,7 @@
             </a:r>
             <a:r>
               <a:rPr lang="en-US" sz="3000" dirty="0"/>
-              <a:t>, and listens for incoming data from the </a:t>
+              <a:t>, and listens for incoming data from another </a:t>
             </a:r>
             <a:r>
               <a:rPr lang="en-US" sz="3000" dirty="0" err="1"/>
@@ -4460,15 +4460,7 @@
             </a:r>
             <a:r>
               <a:rPr lang="en-US" sz="3000" dirty="0"/>
-              <a:t> to implement our gauges and graphs. </a:t>
-            </a:r>
-            <a:r>
-              <a:rPr lang="en-US" sz="3000"/>
-              <a:t>When </a:t>
-            </a:r>
-            <a:r>
-              <a:rPr lang="en-US" sz="3000" dirty="0"/>
-              <a:t>data is received from the </a:t>
+              <a:t> to implement our gauges and graphs. When data is received from the </a:t>
             </a:r>
             <a:r>
               <a:rPr lang="en-US" sz="3000" dirty="0" err="1"/>
@@ -4507,7 +4499,7 @@
         </p:nvSpPr>
         <p:spPr>
           <a:xfrm>
-            <a:off x="1406151" y="2778448"/>
+            <a:off x="1406151" y="2675081"/>
             <a:ext cx="8550648" cy="2146611"/>
           </a:xfrm>
           <a:prstGeom prst="rect">
@@ -4676,18 +4668,29 @@
           <a:p>
             <a:pPr algn="l"/>
             <a:r>
-              <a:rPr lang="en-US" sz="5400">
+              <a:rPr lang="en-US" sz="5400" dirty="0">
                 <a:solidFill>
                   <a:srgbClr val="F37321"/>
                 </a:solidFill>
               </a:rPr>
-              <a:t>The components of Hyro in detail.</a:t>
-            </a:r>
-            <a:endParaRPr lang="en-US" sz="5400" dirty="0">
-              <a:solidFill>
-                <a:srgbClr val="F37321"/>
-              </a:solidFill>
-            </a:endParaRPr>
+              <a:t>The components of </a:t>
+            </a:r>
+            <a:r>
+              <a:rPr lang="en-US" sz="5400" dirty="0" err="1">
+                <a:solidFill>
+                  <a:srgbClr val="F37321"/>
+                </a:solidFill>
+              </a:rPr>
+              <a:t>Hyro</a:t>
+            </a:r>
+            <a:r>
+              <a:rPr lang="en-US" sz="5400" dirty="0">
+                <a:solidFill>
+                  <a:srgbClr val="F37321"/>
+                </a:solidFill>
+              </a:rPr>
+              <a:t> in detail.</a:t>
+            </a:r>
           </a:p>
         </p:txBody>
       </p:sp>
@@ -5072,8 +5075,8 @@
         </p:blipFill>
         <p:spPr>
           <a:xfrm>
-            <a:off x="12469124" y="5331461"/>
-            <a:ext cx="18951756" cy="7241552"/>
+            <a:off x="12954000" y="5331461"/>
+            <a:ext cx="17780000" cy="7241552"/>
           </a:xfrm>
           <a:prstGeom prst="rect">
             <a:avLst/>
@@ -5096,7 +5099,7 @@
         </p:blipFill>
         <p:spPr>
           <a:xfrm>
-            <a:off x="711200" y="20726400"/>
+            <a:off x="1406151" y="20726400"/>
             <a:ext cx="9297361" cy="10970234"/>
           </a:xfrm>
           <a:prstGeom prst="rect">

</xml_diff>